<commit_message>
Updated slide and definition formatting
</commit_message>
<xml_diff>
--- a/Crumbs.pptx
+++ b/Crumbs.pptx
@@ -216,7 +216,7 @@
           <a:p>
             <a:fld id="{C098DEC9-F28E-490C-8688-2DDE9726B96D}" type="datetimeFigureOut">
               <a:rPr lang="en-US" smtClean="0"/>
-              <a:t>6/29/2018</a:t>
+              <a:t>6/30/2018</a:t>
             </a:fld>
             <a:endParaRPr lang="en-US"/>
           </a:p>
@@ -614,7 +614,7 @@
           <a:p>
             <a:fld id="{6A4AF5F2-8E9F-4A4C-8B49-450F53D80A52}" type="datetimeFigureOut">
               <a:rPr lang="en-US" smtClean="0"/>
-              <a:t>6/29/2018</a:t>
+              <a:t>6/30/2018</a:t>
             </a:fld>
             <a:endParaRPr lang="en-US"/>
           </a:p>
@@ -784,7 +784,7 @@
           <a:p>
             <a:fld id="{6A4AF5F2-8E9F-4A4C-8B49-450F53D80A52}" type="datetimeFigureOut">
               <a:rPr lang="en-US" smtClean="0"/>
-              <a:t>6/29/2018</a:t>
+              <a:t>6/30/2018</a:t>
             </a:fld>
             <a:endParaRPr lang="en-US"/>
           </a:p>
@@ -964,7 +964,7 @@
           <a:p>
             <a:fld id="{6A4AF5F2-8E9F-4A4C-8B49-450F53D80A52}" type="datetimeFigureOut">
               <a:rPr lang="en-US" smtClean="0"/>
-              <a:t>6/29/2018</a:t>
+              <a:t>6/30/2018</a:t>
             </a:fld>
             <a:endParaRPr lang="en-US"/>
           </a:p>
@@ -1132,7 +1132,7 @@
           <a:p>
             <a:fld id="{6A4AF5F2-8E9F-4A4C-8B49-450F53D80A52}" type="datetimeFigureOut">
               <a:rPr lang="en-US" smtClean="0"/>
-              <a:t>6/29/2018</a:t>
+              <a:t>6/30/2018</a:t>
             </a:fld>
             <a:endParaRPr lang="en-US"/>
           </a:p>
@@ -1793,7 +1793,7 @@
           <a:p>
             <a:fld id="{6A4AF5F2-8E9F-4A4C-8B49-450F53D80A52}" type="datetimeFigureOut">
               <a:rPr lang="en-US" smtClean="0"/>
-              <a:t>6/29/2018</a:t>
+              <a:t>6/30/2018</a:t>
             </a:fld>
             <a:endParaRPr lang="en-US"/>
           </a:p>
@@ -2025,7 +2025,7 @@
           <a:p>
             <a:fld id="{6A4AF5F2-8E9F-4A4C-8B49-450F53D80A52}" type="datetimeFigureOut">
               <a:rPr lang="en-US" smtClean="0"/>
-              <a:t>6/29/2018</a:t>
+              <a:t>6/30/2018</a:t>
             </a:fld>
             <a:endParaRPr lang="en-US"/>
           </a:p>
@@ -2392,7 +2392,7 @@
           <a:p>
             <a:fld id="{6A4AF5F2-8E9F-4A4C-8B49-450F53D80A52}" type="datetimeFigureOut">
               <a:rPr lang="en-US" smtClean="0"/>
-              <a:t>6/29/2018</a:t>
+              <a:t>6/30/2018</a:t>
             </a:fld>
             <a:endParaRPr lang="en-US"/>
           </a:p>
@@ -2510,7 +2510,7 @@
           <a:p>
             <a:fld id="{6A4AF5F2-8E9F-4A4C-8B49-450F53D80A52}" type="datetimeFigureOut">
               <a:rPr lang="en-US" smtClean="0"/>
-              <a:t>6/29/2018</a:t>
+              <a:t>6/30/2018</a:t>
             </a:fld>
             <a:endParaRPr lang="en-US"/>
           </a:p>
@@ -2605,7 +2605,7 @@
           <a:p>
             <a:fld id="{6A4AF5F2-8E9F-4A4C-8B49-450F53D80A52}" type="datetimeFigureOut">
               <a:rPr lang="en-US" smtClean="0"/>
-              <a:t>6/29/2018</a:t>
+              <a:t>6/30/2018</a:t>
             </a:fld>
             <a:endParaRPr lang="en-US"/>
           </a:p>
@@ -2882,7 +2882,7 @@
           <a:p>
             <a:fld id="{6A4AF5F2-8E9F-4A4C-8B49-450F53D80A52}" type="datetimeFigureOut">
               <a:rPr lang="en-US" smtClean="0"/>
-              <a:t>6/29/2018</a:t>
+              <a:t>6/30/2018</a:t>
             </a:fld>
             <a:endParaRPr lang="en-US"/>
           </a:p>
@@ -3139,7 +3139,7 @@
           <a:p>
             <a:fld id="{6A4AF5F2-8E9F-4A4C-8B49-450F53D80A52}" type="datetimeFigureOut">
               <a:rPr lang="en-US" smtClean="0"/>
-              <a:t>6/29/2018</a:t>
+              <a:t>6/30/2018</a:t>
             </a:fld>
             <a:endParaRPr lang="en-US"/>
           </a:p>
@@ -3352,7 +3352,7 @@
           <a:p>
             <a:fld id="{6A4AF5F2-8E9F-4A4C-8B49-450F53D80A52}" type="datetimeFigureOut">
               <a:rPr lang="en-US" smtClean="0"/>
-              <a:t>6/29/2018</a:t>
+              <a:t>6/30/2018</a:t>
             </a:fld>
             <a:endParaRPr lang="en-US"/>
           </a:p>
@@ -5334,6 +5334,42 @@
           <a:xfrm>
             <a:off x="7659756" y="168782"/>
             <a:ext cx="1484244" cy="952280"/>
+          </a:xfrm>
+          <a:prstGeom prst="rect">
+            <a:avLst/>
+          </a:prstGeom>
+        </p:spPr>
+      </p:pic>
+      <p:pic>
+        <p:nvPicPr>
+          <p:cNvPr id="34" name="Picture 33">
+            <a:extLst>
+              <a:ext uri="{FF2B5EF4-FFF2-40B4-BE49-F238E27FC236}">
+                <a16:creationId xmlns:a16="http://schemas.microsoft.com/office/drawing/2014/main" id="{A48FD4E6-518F-4F7D-86B7-9473636F0772}"/>
+              </a:ext>
+            </a:extLst>
+          </p:cNvPr>
+          <p:cNvPicPr>
+            <a:picLocks noChangeAspect="1"/>
+          </p:cNvPicPr>
+          <p:nvPr/>
+        </p:nvPicPr>
+        <p:blipFill>
+          <a:blip r:embed="rId12" cstate="print">
+            <a:extLst>
+              <a:ext uri="{28A0092B-C50C-407E-A947-70E740481C1C}">
+                <a14:useLocalDpi xmlns:a14="http://schemas.microsoft.com/office/drawing/2010/main" val="0"/>
+              </a:ext>
+            </a:extLst>
+          </a:blip>
+          <a:stretch>
+            <a:fillRect/>
+          </a:stretch>
+        </p:blipFill>
+        <p:spPr>
+          <a:xfrm>
+            <a:off x="4319769" y="4424380"/>
+            <a:ext cx="742616" cy="454175"/>
           </a:xfrm>
           <a:prstGeom prst="rect">
             <a:avLst/>

</xml_diff>